<commit_message>
feat: added case study 2 a
</commit_message>
<xml_diff>
--- a/Case Study 2/Pizza Runner.pptx
+++ b/Case Study 2/Pizza Runner.pptx
@@ -231,7 +231,7 @@
           <a:p>
             <a:fld id="{8848E0E1-5275-49A1-B239-CAE995FD4BA5}" type="datetimeFigureOut">
               <a:rPr lang="en-IN" smtClean="0"/>
-              <a:t>07-04-2024</a:t>
+              <a:t>08-04-2024</a:t>
             </a:fld>
             <a:endParaRPr lang="en-IN"/>
           </a:p>
@@ -714,7 +714,7 @@
           <a:p>
             <a:fld id="{A805D841-954D-440B-8EA3-92F49FCE6C05}" type="datetime1">
               <a:rPr lang="en-IN" smtClean="0"/>
-              <a:t>07-04-2024</a:t>
+              <a:t>08-04-2024</a:t>
             </a:fld>
             <a:endParaRPr lang="en-IN"/>
           </a:p>
@@ -888,7 +888,7 @@
           <a:p>
             <a:fld id="{73F3396D-3375-4C26-A119-030B71F34377}" type="datetime1">
               <a:rPr lang="en-IN" smtClean="0"/>
-              <a:t>07-04-2024</a:t>
+              <a:t>08-04-2024</a:t>
             </a:fld>
             <a:endParaRPr lang="en-IN"/>
           </a:p>
@@ -1072,7 +1072,7 @@
           <a:p>
             <a:fld id="{C3AE0B80-1AE1-4C07-9174-6C7410DF935E}" type="datetime1">
               <a:rPr lang="en-IN" smtClean="0"/>
-              <a:t>07-04-2024</a:t>
+              <a:t>08-04-2024</a:t>
             </a:fld>
             <a:endParaRPr lang="en-IN"/>
           </a:p>
@@ -1246,7 +1246,7 @@
           <a:p>
             <a:fld id="{E532DA67-9BC3-4C26-B607-8F4BB4EA1B14}" type="datetime1">
               <a:rPr lang="en-IN" smtClean="0"/>
-              <a:t>07-04-2024</a:t>
+              <a:t>08-04-2024</a:t>
             </a:fld>
             <a:endParaRPr lang="en-IN"/>
           </a:p>
@@ -1496,7 +1496,7 @@
           <a:p>
             <a:fld id="{A888154D-52F1-4F61-8B4D-3DDDA1D18549}" type="datetime1">
               <a:rPr lang="en-IN" smtClean="0"/>
-              <a:t>07-04-2024</a:t>
+              <a:t>08-04-2024</a:t>
             </a:fld>
             <a:endParaRPr lang="en-IN"/>
           </a:p>
@@ -1732,7 +1732,7 @@
           <a:p>
             <a:fld id="{41E61214-9390-457C-9922-9698893DDA7B}" type="datetime1">
               <a:rPr lang="en-IN" smtClean="0"/>
-              <a:t>07-04-2024</a:t>
+              <a:t>08-04-2024</a:t>
             </a:fld>
             <a:endParaRPr lang="en-IN"/>
           </a:p>
@@ -2103,7 +2103,7 @@
           <a:p>
             <a:fld id="{3DF4E67D-1030-431E-A89A-9EEC73057307}" type="datetime1">
               <a:rPr lang="en-IN" smtClean="0"/>
-              <a:t>07-04-2024</a:t>
+              <a:t>08-04-2024</a:t>
             </a:fld>
             <a:endParaRPr lang="en-IN"/>
           </a:p>
@@ -2225,7 +2225,7 @@
           <a:p>
             <a:fld id="{357E7CB6-5E6A-4873-B020-1E78121267AD}" type="datetime1">
               <a:rPr lang="en-IN" smtClean="0"/>
-              <a:t>07-04-2024</a:t>
+              <a:t>08-04-2024</a:t>
             </a:fld>
             <a:endParaRPr lang="en-IN"/>
           </a:p>
@@ -2324,7 +2324,7 @@
           <a:p>
             <a:fld id="{7EEDFCA7-F6A8-4787-B86B-6B8E55609377}" type="datetime1">
               <a:rPr lang="en-IN" smtClean="0"/>
-              <a:t>07-04-2024</a:t>
+              <a:t>08-04-2024</a:t>
             </a:fld>
             <a:endParaRPr lang="en-IN"/>
           </a:p>
@@ -2605,7 +2605,7 @@
           <a:p>
             <a:fld id="{6BC0F902-89FE-401B-BC29-C913F68035EE}" type="datetime1">
               <a:rPr lang="en-IN" smtClean="0"/>
-              <a:t>07-04-2024</a:t>
+              <a:t>08-04-2024</a:t>
             </a:fld>
             <a:endParaRPr lang="en-IN"/>
           </a:p>
@@ -2862,7 +2862,7 @@
           <a:p>
             <a:fld id="{F97FE926-F451-429B-AB06-FA69F20AB8DF}" type="datetime1">
               <a:rPr lang="en-IN" smtClean="0"/>
-              <a:t>07-04-2024</a:t>
+              <a:t>08-04-2024</a:t>
             </a:fld>
             <a:endParaRPr lang="en-IN"/>
           </a:p>
@@ -3079,7 +3079,7 @@
           <a:p>
             <a:fld id="{0EA83B4C-E197-45F8-8FD5-7BB2896557CA}" type="datetime1">
               <a:rPr lang="en-IN" smtClean="0"/>
-              <a:t>07-04-2024</a:t>
+              <a:t>08-04-2024</a:t>
             </a:fld>
             <a:endParaRPr lang="en-IN"/>
           </a:p>
@@ -3611,7 +3611,7 @@
           <a:p>
             <a:fld id="{6BC0F902-89FE-401B-BC29-C913F68035EE}" type="datetime1">
               <a:rPr lang="en-IN" smtClean="0"/>
-              <a:t>07-04-2024</a:t>
+              <a:t>08-04-2024</a:t>
             </a:fld>
             <a:endParaRPr lang="en-IN"/>
           </a:p>
@@ -3717,11 +3717,7 @@
           <a:p>
             <a:r>
               <a:rPr lang="en-US" sz="4000" dirty="0" smtClean="0"/>
-              <a:t>6. What </a:t>
-            </a:r>
-            <a:r>
-              <a:rPr lang="en-US" sz="4000" dirty="0" smtClean="0"/>
-              <a:t>was the maximum number of pizzas delivered in a single order?</a:t>
+              <a:t>6. What was the maximum number of pizzas delivered in a single order?</a:t>
             </a:r>
             <a:endParaRPr lang="en-IN" sz="4000" dirty="0"/>
           </a:p>
@@ -3773,7 +3769,7 @@
           <a:p>
             <a:fld id="{6440BD26-3411-47D8-A0B3-FF608FBCAD69}" type="datetime1">
               <a:rPr lang="en-IN" smtClean="0"/>
-              <a:t>07-04-2024</a:t>
+              <a:t>08-04-2024</a:t>
             </a:fld>
             <a:endParaRPr lang="en-IN"/>
           </a:p>
@@ -3882,11 +3878,7 @@
             </a:r>
             <a:r>
               <a:rPr lang="en-US" sz="4000" dirty="0" smtClean="0"/>
-              <a:t>For </a:t>
-            </a:r>
-            <a:r>
-              <a:rPr lang="en-US" sz="4000" dirty="0" smtClean="0"/>
-              <a:t>each customer, how many delivered pizzas had at least 1 change and how many had no changes?</a:t>
+              <a:t>For each customer, how many delivered pizzas had at least 1 change and how many had no changes?</a:t>
             </a:r>
             <a:endParaRPr lang="en-IN" sz="4000" dirty="0"/>
           </a:p>
@@ -3968,7 +3960,7 @@
           <a:p>
             <a:fld id="{16DDC3CD-8FA1-4488-9F32-51E1E6B553A6}" type="datetime1">
               <a:rPr lang="en-IN" smtClean="0"/>
-              <a:t>07-04-2024</a:t>
+              <a:t>08-04-2024</a:t>
             </a:fld>
             <a:endParaRPr lang="en-IN"/>
           </a:p>
@@ -4069,11 +4061,7 @@
           <a:p>
             <a:r>
               <a:rPr lang="en-US" sz="4000" dirty="0" smtClean="0"/>
-              <a:t>8. How </a:t>
-            </a:r>
-            <a:r>
-              <a:rPr lang="en-US" sz="4000" dirty="0" smtClean="0"/>
-              <a:t>many pizzas were delivered that had both exclusions and extras?</a:t>
+              <a:t>8. How many pizzas were delivered that had both exclusions and extras?</a:t>
             </a:r>
             <a:endParaRPr lang="en-IN" sz="4000" dirty="0"/>
           </a:p>
@@ -4125,7 +4113,7 @@
           <a:p>
             <a:fld id="{EE5D1C81-2B07-4138-93EB-1DA2032013B0}" type="datetime1">
               <a:rPr lang="en-IN" smtClean="0"/>
-              <a:t>07-04-2024</a:t>
+              <a:t>08-04-2024</a:t>
             </a:fld>
             <a:endParaRPr lang="en-IN"/>
           </a:p>
@@ -4226,11 +4214,7 @@
           <a:p>
             <a:r>
               <a:rPr lang="en-US" sz="4000" dirty="0" smtClean="0"/>
-              <a:t>9. What </a:t>
-            </a:r>
-            <a:r>
-              <a:rPr lang="en-US" sz="4000" dirty="0" smtClean="0"/>
-              <a:t>was the total volume of pizzas ordered for each hour of the day?</a:t>
+              <a:t>9. What was the total volume of pizzas ordered for each hour of the day?</a:t>
             </a:r>
             <a:endParaRPr lang="en-IN" sz="4000" dirty="0"/>
           </a:p>
@@ -4253,7 +4237,7 @@
           <a:p>
             <a:fld id="{E532DA67-9BC3-4C26-B607-8F4BB4EA1B14}" type="datetime1">
               <a:rPr lang="en-IN" smtClean="0"/>
-              <a:t>07-04-2024</a:t>
+              <a:t>08-04-2024</a:t>
             </a:fld>
             <a:endParaRPr lang="en-IN"/>
           </a:p>
@@ -4391,11 +4375,7 @@
             </a:r>
             <a:r>
               <a:rPr lang="en-US" sz="4000" dirty="0" smtClean="0"/>
-              <a:t>What </a:t>
-            </a:r>
-            <a:r>
-              <a:rPr lang="en-US" sz="4000" dirty="0" smtClean="0"/>
-              <a:t>was the volume of orders for each day of the week?</a:t>
+              <a:t>What was the volume of orders for each day of the week?</a:t>
             </a:r>
             <a:endParaRPr lang="en-IN" sz="4000" dirty="0"/>
           </a:p>
@@ -4418,7 +4398,7 @@
           <a:p>
             <a:fld id="{E532DA67-9BC3-4C26-B607-8F4BB4EA1B14}" type="datetime1">
               <a:rPr lang="en-IN" smtClean="0"/>
-              <a:t>07-04-2024</a:t>
+              <a:t>08-04-2024</a:t>
             </a:fld>
             <a:endParaRPr lang="en-IN"/>
           </a:p>
@@ -4711,7 +4691,7 @@
           <a:p>
             <a:fld id="{E532DA67-9BC3-4C26-B607-8F4BB4EA1B14}" type="datetime1">
               <a:rPr lang="en-IN" smtClean="0"/>
-              <a:t>07-04-2024</a:t>
+              <a:t>08-04-2024</a:t>
             </a:fld>
             <a:endParaRPr lang="en-IN"/>
           </a:p>
@@ -4868,7 +4848,7 @@
           <a:p>
             <a:fld id="{E532DA67-9BC3-4C26-B607-8F4BB4EA1B14}" type="datetime1">
               <a:rPr lang="en-IN" smtClean="0"/>
-              <a:t>07-04-2024</a:t>
+              <a:t>08-04-2024</a:t>
             </a:fld>
             <a:endParaRPr lang="en-IN"/>
           </a:p>
@@ -5038,7 +5018,7 @@
           <a:p>
             <a:fld id="{E532DA67-9BC3-4C26-B607-8F4BB4EA1B14}" type="datetime1">
               <a:rPr lang="en-IN" smtClean="0"/>
-              <a:t>07-04-2024</a:t>
+              <a:t>08-04-2024</a:t>
             </a:fld>
             <a:endParaRPr lang="en-IN"/>
           </a:p>
@@ -5247,7 +5227,7 @@
           <a:p>
             <a:fld id="{41E61214-9390-457C-9922-9698893DDA7B}" type="datetime1">
               <a:rPr lang="en-IN" smtClean="0"/>
-              <a:t>07-04-2024</a:t>
+              <a:t>08-04-2024</a:t>
             </a:fld>
             <a:endParaRPr lang="en-IN"/>
           </a:p>
@@ -5404,7 +5384,7 @@
           <a:p>
             <a:fld id="{E532DA67-9BC3-4C26-B607-8F4BB4EA1B14}" type="datetime1">
               <a:rPr lang="en-IN" smtClean="0"/>
-              <a:t>07-04-2024</a:t>
+              <a:t>08-04-2024</a:t>
             </a:fld>
             <a:endParaRPr lang="en-IN"/>
           </a:p>
@@ -5610,7 +5590,7 @@
           <a:p>
             <a:fld id="{780D33DB-947F-4658-A993-FC3B5A6AF569}" type="datetime1">
               <a:rPr lang="en-IN" smtClean="0"/>
-              <a:t>07-04-2024</a:t>
+              <a:t>08-04-2024</a:t>
             </a:fld>
             <a:endParaRPr lang="en-IN"/>
           </a:p>
@@ -5767,7 +5747,7 @@
           <a:p>
             <a:fld id="{E532DA67-9BC3-4C26-B607-8F4BB4EA1B14}" type="datetime1">
               <a:rPr lang="en-IN" smtClean="0"/>
-              <a:t>07-04-2024</a:t>
+              <a:t>08-04-2024</a:t>
             </a:fld>
             <a:endParaRPr lang="en-IN"/>
           </a:p>
@@ -5925,7 +5905,7 @@
           <a:p>
             <a:fld id="{41E61214-9390-457C-9922-9698893DDA7B}" type="datetime1">
               <a:rPr lang="en-IN" smtClean="0"/>
-              <a:t>07-04-2024</a:t>
+              <a:t>08-04-2024</a:t>
             </a:fld>
             <a:endParaRPr lang="en-IN"/>
           </a:p>
@@ -6183,7 +6163,7 @@
           <a:p>
             <a:fld id="{41E61214-9390-457C-9922-9698893DDA7B}" type="datetime1">
               <a:rPr lang="en-IN" smtClean="0"/>
-              <a:t>07-04-2024</a:t>
+              <a:t>08-04-2024</a:t>
             </a:fld>
             <a:endParaRPr lang="en-IN"/>
           </a:p>
@@ -6314,7 +6294,7 @@
           <a:p>
             <a:fld id="{E532DA67-9BC3-4C26-B607-8F4BB4EA1B14}" type="datetime1">
               <a:rPr lang="en-IN" smtClean="0"/>
-              <a:t>07-04-2024</a:t>
+              <a:t>08-04-2024</a:t>
             </a:fld>
             <a:endParaRPr lang="en-IN"/>
           </a:p>
@@ -6640,7 +6620,7 @@
           <a:p>
             <a:fld id="{41E61214-9390-457C-9922-9698893DDA7B}" type="datetime1">
               <a:rPr lang="en-IN" smtClean="0"/>
-              <a:t>07-04-2024</a:t>
+              <a:t>08-04-2024</a:t>
             </a:fld>
             <a:endParaRPr lang="en-IN"/>
           </a:p>
@@ -6823,7 +6803,7 @@
           <a:p>
             <a:fld id="{41E61214-9390-457C-9922-9698893DDA7B}" type="datetime1">
               <a:rPr lang="en-IN" smtClean="0"/>
-              <a:t>07-04-2024</a:t>
+              <a:t>08-04-2024</a:t>
             </a:fld>
             <a:endParaRPr lang="en-IN"/>
           </a:p>
@@ -7006,7 +6986,7 @@
           <a:p>
             <a:fld id="{41E61214-9390-457C-9922-9698893DDA7B}" type="datetime1">
               <a:rPr lang="en-IN" smtClean="0"/>
-              <a:t>07-04-2024</a:t>
+              <a:t>08-04-2024</a:t>
             </a:fld>
             <a:endParaRPr lang="en-IN"/>
           </a:p>
@@ -7243,7 +7223,7 @@
           <a:p>
             <a:fld id="{41E61214-9390-457C-9922-9698893DDA7B}" type="datetime1">
               <a:rPr lang="en-IN" smtClean="0"/>
-              <a:t>07-04-2024</a:t>
+              <a:t>08-04-2024</a:t>
             </a:fld>
             <a:endParaRPr lang="en-IN"/>
           </a:p>
@@ -7419,7 +7399,7 @@
           <a:p>
             <a:fld id="{41E61214-9390-457C-9922-9698893DDA7B}" type="datetime1">
               <a:rPr lang="en-IN" smtClean="0"/>
-              <a:t>07-04-2024</a:t>
+              <a:t>08-04-2024</a:t>
             </a:fld>
             <a:endParaRPr lang="en-IN"/>
           </a:p>
@@ -7630,7 +7610,7 @@
           <a:p>
             <a:fld id="{41E61214-9390-457C-9922-9698893DDA7B}" type="datetime1">
               <a:rPr lang="en-IN" smtClean="0"/>
-              <a:t>07-04-2024</a:t>
+              <a:t>08-04-2024</a:t>
             </a:fld>
             <a:endParaRPr lang="en-IN"/>
           </a:p>
@@ -7788,7 +7768,7 @@
           <a:p>
             <a:fld id="{0CBCE8AF-A837-4079-B21A-D34F3EBB2F11}" type="datetime1">
               <a:rPr lang="en-IN" smtClean="0"/>
-              <a:t>07-04-2024</a:t>
+              <a:t>08-04-2024</a:t>
             </a:fld>
             <a:endParaRPr lang="en-IN"/>
           </a:p>
@@ -8080,7 +8060,7 @@
           <a:p>
             <a:fld id="{E532DA67-9BC3-4C26-B607-8F4BB4EA1B14}" type="datetime1">
               <a:rPr lang="en-IN" smtClean="0"/>
-              <a:t>07-04-2024</a:t>
+              <a:t>08-04-2024</a:t>
             </a:fld>
             <a:endParaRPr lang="en-IN"/>
           </a:p>
@@ -8283,7 +8263,7 @@
           <a:p>
             <a:fld id="{41E61214-9390-457C-9922-9698893DDA7B}" type="datetime1">
               <a:rPr lang="en-IN" smtClean="0"/>
-              <a:t>07-04-2024</a:t>
+              <a:t>08-04-2024</a:t>
             </a:fld>
             <a:endParaRPr lang="en-IN"/>
           </a:p>
@@ -8473,7 +8453,7 @@
           <a:p>
             <a:fld id="{41E61214-9390-457C-9922-9698893DDA7B}" type="datetime1">
               <a:rPr lang="en-IN" smtClean="0"/>
-              <a:t>07-04-2024</a:t>
+              <a:t>08-04-2024</a:t>
             </a:fld>
             <a:endParaRPr lang="en-IN"/>
           </a:p>
@@ -9374,7 +9354,7 @@
           <a:p>
             <a:fld id="{1BEA5687-2B3B-4F76-AAE8-C0BE9582DEA9}" type="datetime1">
               <a:rPr lang="en-IN" smtClean="0"/>
-              <a:t>07-04-2024</a:t>
+              <a:t>08-04-2024</a:t>
             </a:fld>
             <a:endParaRPr lang="en-IN"/>
           </a:p>
@@ -9483,11 +9463,7 @@
             </a:r>
             <a:r>
               <a:rPr lang="en-US" sz="3600" dirty="0" smtClean="0"/>
-              <a:t>How </a:t>
-            </a:r>
-            <a:r>
-              <a:rPr lang="en-US" sz="3600" dirty="0" smtClean="0"/>
-              <a:t>many pizzas were ordered?</a:t>
+              <a:t>How many pizzas were ordered?</a:t>
             </a:r>
             <a:endParaRPr lang="en-IN" sz="3600" b="1" dirty="0"/>
           </a:p>
@@ -9539,7 +9515,7 @@
           <a:p>
             <a:fld id="{006F1D24-CDC7-4517-88F4-C1FA14C6CDE0}" type="datetime1">
               <a:rPr lang="en-IN" smtClean="0"/>
-              <a:t>07-04-2024</a:t>
+              <a:t>08-04-2024</a:t>
             </a:fld>
             <a:endParaRPr lang="en-IN"/>
           </a:p>
@@ -9648,11 +9624,7 @@
             </a:r>
             <a:r>
               <a:rPr lang="en-US" sz="3600" dirty="0" smtClean="0"/>
-              <a:t>How </a:t>
-            </a:r>
-            <a:r>
-              <a:rPr lang="en-US" sz="3600" dirty="0" smtClean="0"/>
-              <a:t>many unique customer orders were made?</a:t>
+              <a:t>How many unique customer orders were made?</a:t>
             </a:r>
             <a:endParaRPr lang="en-IN" sz="4000" b="1" dirty="0"/>
           </a:p>
@@ -9704,7 +9676,7 @@
           <a:p>
             <a:fld id="{223F549C-B323-442E-8F13-8115FCC62AF5}" type="datetime1">
               <a:rPr lang="en-IN" smtClean="0"/>
-              <a:t>07-04-2024</a:t>
+              <a:t>08-04-2024</a:t>
             </a:fld>
             <a:endParaRPr lang="en-IN"/>
           </a:p>
@@ -9814,11 +9786,7 @@
             </a:r>
             <a:r>
               <a:rPr lang="en-US" sz="4000" dirty="0" smtClean="0"/>
-              <a:t>How </a:t>
-            </a:r>
-            <a:r>
-              <a:rPr lang="en-US" sz="4000" dirty="0" smtClean="0"/>
-              <a:t>many successful orders were delivered by each runner?</a:t>
+              <a:t>How many successful orders were delivered by each runner?</a:t>
             </a:r>
             <a:endParaRPr lang="en-IN" sz="4000" dirty="0"/>
           </a:p>
@@ -9870,7 +9838,7 @@
           <a:p>
             <a:fld id="{F398A40E-062E-4012-A46D-72B6F10C9F24}" type="datetime1">
               <a:rPr lang="en-IN" smtClean="0"/>
-              <a:t>07-04-2024</a:t>
+              <a:t>08-04-2024</a:t>
             </a:fld>
             <a:endParaRPr lang="en-IN"/>
           </a:p>
@@ -9979,11 +9947,7 @@
             </a:r>
             <a:r>
               <a:rPr lang="en-US" sz="3600" dirty="0" smtClean="0"/>
-              <a:t>How </a:t>
-            </a:r>
-            <a:r>
-              <a:rPr lang="en-US" sz="3600" dirty="0" smtClean="0"/>
-              <a:t>many of each type of pizza was delivered?</a:t>
+              <a:t>How many of each type of pizza was delivered?</a:t>
             </a:r>
             <a:endParaRPr lang="en-IN" sz="3600" dirty="0"/>
           </a:p>
@@ -10035,7 +9999,7 @@
           <a:p>
             <a:fld id="{BAF511C7-F5B8-44A1-A2A8-46EF4D0DE7B7}" type="datetime1">
               <a:rPr lang="en-IN" smtClean="0"/>
-              <a:t>07-04-2024</a:t>
+              <a:t>08-04-2024</a:t>
             </a:fld>
             <a:endParaRPr lang="en-IN"/>
           </a:p>
@@ -10141,19 +10105,7 @@
           <a:p>
             <a:r>
               <a:rPr lang="en-US" sz="4000" dirty="0" smtClean="0"/>
-              <a:t>5. How </a:t>
-            </a:r>
-            <a:r>
-              <a:rPr lang="en-US" sz="4000" dirty="0" smtClean="0"/>
-              <a:t>many Vegetarian and </a:t>
-            </a:r>
-            <a:r>
-              <a:rPr lang="en-US" sz="4000" dirty="0" smtClean="0"/>
-              <a:t>Meat lovers </a:t>
-            </a:r>
-            <a:r>
-              <a:rPr lang="en-US" sz="4000" dirty="0" smtClean="0"/>
-              <a:t>were ordered by each customer?</a:t>
+              <a:t>5. How many Vegetarian and Meat lovers were ordered by each customer?</a:t>
             </a:r>
             <a:endParaRPr lang="en-IN" sz="4000" dirty="0"/>
           </a:p>
@@ -10205,7 +10157,7 @@
           <a:p>
             <a:fld id="{71048FB8-C687-4510-95A1-5F5E96400C18}" type="datetime1">
               <a:rPr lang="en-IN" smtClean="0"/>
-              <a:t>07-04-2024</a:t>
+              <a:t>08-04-2024</a:t>
             </a:fld>
             <a:endParaRPr lang="en-IN"/>
           </a:p>

</xml_diff>